<commit_message>
Delete temporary MS Office file and add logo mage file
</commit_message>
<xml_diff>
--- a/document/logo_design.pptx
+++ b/document/logo_design.pptx
@@ -207,7 +207,7 @@
           <a:p>
             <a:fld id="{519690E7-8DBA-4A0E-B476-C5FE34DE0ACA}" type="datetimeFigureOut">
               <a:rPr lang="ko-KR" altLang="en-US" smtClean="0"/>
-              <a:t>2025-11-04</a:t>
+              <a:t>2025-11-14</a:t>
             </a:fld>
             <a:endParaRPr lang="ko-KR" altLang="en-US"/>
           </a:p>
@@ -621,7 +621,7 @@
           <a:p>
             <a:fld id="{17E7E7E4-8F6B-49E5-ACF9-D2BCA6A809F9}" type="datetimeFigureOut">
               <a:rPr lang="ko-KR" altLang="en-US" smtClean="0"/>
-              <a:t>2025-11-04</a:t>
+              <a:t>2025-11-14</a:t>
             </a:fld>
             <a:endParaRPr lang="ko-KR" altLang="en-US"/>
           </a:p>
@@ -819,7 +819,7 @@
           <a:p>
             <a:fld id="{17E7E7E4-8F6B-49E5-ACF9-D2BCA6A809F9}" type="datetimeFigureOut">
               <a:rPr lang="ko-KR" altLang="en-US" smtClean="0"/>
-              <a:t>2025-11-04</a:t>
+              <a:t>2025-11-14</a:t>
             </a:fld>
             <a:endParaRPr lang="ko-KR" altLang="en-US"/>
           </a:p>
@@ -1027,7 +1027,7 @@
           <a:p>
             <a:fld id="{17E7E7E4-8F6B-49E5-ACF9-D2BCA6A809F9}" type="datetimeFigureOut">
               <a:rPr lang="ko-KR" altLang="en-US" smtClean="0"/>
-              <a:t>2025-11-04</a:t>
+              <a:t>2025-11-14</a:t>
             </a:fld>
             <a:endParaRPr lang="ko-KR" altLang="en-US"/>
           </a:p>
@@ -1225,7 +1225,7 @@
           <a:p>
             <a:fld id="{17E7E7E4-8F6B-49E5-ACF9-D2BCA6A809F9}" type="datetimeFigureOut">
               <a:rPr lang="ko-KR" altLang="en-US" smtClean="0"/>
-              <a:t>2025-11-04</a:t>
+              <a:t>2025-11-14</a:t>
             </a:fld>
             <a:endParaRPr lang="ko-KR" altLang="en-US"/>
           </a:p>
@@ -1500,7 +1500,7 @@
           <a:p>
             <a:fld id="{17E7E7E4-8F6B-49E5-ACF9-D2BCA6A809F9}" type="datetimeFigureOut">
               <a:rPr lang="ko-KR" altLang="en-US" smtClean="0"/>
-              <a:t>2025-11-04</a:t>
+              <a:t>2025-11-14</a:t>
             </a:fld>
             <a:endParaRPr lang="ko-KR" altLang="en-US"/>
           </a:p>
@@ -1765,7 +1765,7 @@
           <a:p>
             <a:fld id="{17E7E7E4-8F6B-49E5-ACF9-D2BCA6A809F9}" type="datetimeFigureOut">
               <a:rPr lang="ko-KR" altLang="en-US" smtClean="0"/>
-              <a:t>2025-11-04</a:t>
+              <a:t>2025-11-14</a:t>
             </a:fld>
             <a:endParaRPr lang="ko-KR" altLang="en-US"/>
           </a:p>
@@ -2177,7 +2177,7 @@
           <a:p>
             <a:fld id="{17E7E7E4-8F6B-49E5-ACF9-D2BCA6A809F9}" type="datetimeFigureOut">
               <a:rPr lang="ko-KR" altLang="en-US" smtClean="0"/>
-              <a:t>2025-11-04</a:t>
+              <a:t>2025-11-14</a:t>
             </a:fld>
             <a:endParaRPr lang="ko-KR" altLang="en-US"/>
           </a:p>
@@ -2318,7 +2318,7 @@
           <a:p>
             <a:fld id="{17E7E7E4-8F6B-49E5-ACF9-D2BCA6A809F9}" type="datetimeFigureOut">
               <a:rPr lang="ko-KR" altLang="en-US" smtClean="0"/>
-              <a:t>2025-11-04</a:t>
+              <a:t>2025-11-14</a:t>
             </a:fld>
             <a:endParaRPr lang="ko-KR" altLang="en-US"/>
           </a:p>
@@ -2431,7 +2431,7 @@
           <a:p>
             <a:fld id="{17E7E7E4-8F6B-49E5-ACF9-D2BCA6A809F9}" type="datetimeFigureOut">
               <a:rPr lang="ko-KR" altLang="en-US" smtClean="0"/>
-              <a:t>2025-11-04</a:t>
+              <a:t>2025-11-14</a:t>
             </a:fld>
             <a:endParaRPr lang="ko-KR" altLang="en-US"/>
           </a:p>
@@ -2742,7 +2742,7 @@
           <a:p>
             <a:fld id="{17E7E7E4-8F6B-49E5-ACF9-D2BCA6A809F9}" type="datetimeFigureOut">
               <a:rPr lang="ko-KR" altLang="en-US" smtClean="0"/>
-              <a:t>2025-11-04</a:t>
+              <a:t>2025-11-14</a:t>
             </a:fld>
             <a:endParaRPr lang="ko-KR" altLang="en-US"/>
           </a:p>
@@ -3030,7 +3030,7 @@
           <a:p>
             <a:fld id="{17E7E7E4-8F6B-49E5-ACF9-D2BCA6A809F9}" type="datetimeFigureOut">
               <a:rPr lang="ko-KR" altLang="en-US" smtClean="0"/>
-              <a:t>2025-11-04</a:t>
+              <a:t>2025-11-14</a:t>
             </a:fld>
             <a:endParaRPr lang="ko-KR" altLang="en-US"/>
           </a:p>
@@ -3271,7 +3271,7 @@
           <a:p>
             <a:fld id="{17E7E7E4-8F6B-49E5-ACF9-D2BCA6A809F9}" type="datetimeFigureOut">
               <a:rPr lang="ko-KR" altLang="en-US" smtClean="0"/>
-              <a:t>2025-11-04</a:t>
+              <a:t>2025-11-14</a:t>
             </a:fld>
             <a:endParaRPr lang="ko-KR" altLang="en-US"/>
           </a:p>
@@ -7315,11 +7315,7 @@
           </a:prstGeom>
           <a:noFill/>
           <a:ln>
-            <a:solidFill>
-              <a:schemeClr val="accent6">
-                <a:lumMod val="75000"/>
-              </a:schemeClr>
-            </a:solidFill>
+            <a:noFill/>
           </a:ln>
         </p:spPr>
         <p:style>
@@ -7547,11 +7543,7 @@
             <a:schemeClr val="tx1"/>
           </a:solidFill>
           <a:ln>
-            <a:solidFill>
-              <a:schemeClr val="accent6">
-                <a:lumMod val="75000"/>
-              </a:schemeClr>
-            </a:solidFill>
+            <a:noFill/>
           </a:ln>
         </p:spPr>
         <p:style>
@@ -7600,6 +7592,9 @@
             <a:avLst/>
           </a:prstGeom>
           <a:noFill/>
+          <a:ln>
+            <a:noFill/>
+          </a:ln>
         </p:spPr>
         <p:txBody>
           <a:bodyPr wrap="square" rtlCol="0">
@@ -7650,6 +7645,9 @@
             <a:avLst/>
           </a:prstGeom>
           <a:noFill/>
+          <a:ln>
+            <a:noFill/>
+          </a:ln>
         </p:spPr>
         <p:txBody>
           <a:bodyPr wrap="square" rtlCol="0">
@@ -7809,11 +7807,7 @@
             </a:prstGeom>
             <a:noFill/>
             <a:ln>
-              <a:solidFill>
-                <a:schemeClr val="accent6">
-                  <a:lumMod val="75000"/>
-                </a:schemeClr>
-              </a:solidFill>
+              <a:noFill/>
             </a:ln>
           </p:spPr>
           <p:style>
@@ -7862,6 +7856,9 @@
               <a:avLst/>
             </a:prstGeom>
             <a:noFill/>
+            <a:ln>
+              <a:noFill/>
+            </a:ln>
           </p:spPr>
           <p:txBody>
             <a:bodyPr wrap="square" rtlCol="0">

</xml_diff>

<commit_message>
Update logo file as pack
</commit_message>
<xml_diff>
--- a/document/logo_design.pptx
+++ b/document/logo_design.pptx
@@ -7307,8 +7307,8 @@
         </p:nvSpPr>
         <p:spPr>
           <a:xfrm>
-            <a:off x="1776000" y="1269000"/>
-            <a:ext cx="8640000" cy="4320000"/>
+            <a:off x="2044322" y="1770743"/>
+            <a:ext cx="7920000" cy="3316514"/>
           </a:xfrm>
           <a:prstGeom prst="rect">
             <a:avLst/>
@@ -7402,7 +7402,7 @@
         <p:spPr>
           <a:xfrm>
             <a:off x="6096000" y="2274838"/>
-            <a:ext cx="3945776" cy="2308324"/>
+            <a:ext cx="3868322" cy="2308324"/>
           </a:xfrm>
           <a:prstGeom prst="rect">
             <a:avLst/>
@@ -7521,10 +7521,10 @@
       </p:grpSpPr>
       <p:sp>
         <p:nvSpPr>
-          <p:cNvPr id="2" name="직사각형 1">
+          <p:cNvPr id="5" name="직사각형 4">
             <a:extLst>
               <a:ext uri="{FF2B5EF4-FFF2-40B4-BE49-F238E27FC236}">
-                <a16:creationId xmlns:a16="http://schemas.microsoft.com/office/drawing/2014/main" id="{38EFD486-DE32-2788-FDAE-B6EBB6335E80}"/>
+                <a16:creationId xmlns:a16="http://schemas.microsoft.com/office/drawing/2014/main" id="{307CD9BA-B6AE-8EA3-B0B3-E9066C21F0FD}"/>
               </a:ext>
             </a:extLst>
           </p:cNvPr>
@@ -7533,8 +7533,8 @@
         </p:nvSpPr>
         <p:spPr>
           <a:xfrm>
-            <a:off x="1776000" y="1269000"/>
-            <a:ext cx="8640000" cy="4320000"/>
+            <a:off x="2044322" y="1770743"/>
+            <a:ext cx="7920000" cy="3316514"/>
           </a:xfrm>
           <a:prstGeom prst="rect">
             <a:avLst/>
@@ -7639,7 +7639,7 @@
         <p:spPr>
           <a:xfrm>
             <a:off x="6096000" y="2274838"/>
-            <a:ext cx="3945776" cy="2308324"/>
+            <a:ext cx="3868322" cy="2308324"/>
           </a:xfrm>
           <a:prstGeom prst="rect">
             <a:avLst/>

</xml_diff>